<commit_message>
Updated final paper due date
</commit_message>
<xml_diff>
--- a/lectures/introduction-internship.pptx
+++ b/lectures/introduction-internship.pptx
@@ -184,7 +184,7 @@
   <pc:docChgLst>
     <pc:chgData name="Daniel Ahn" userId="cb1d34211dc1be1a" providerId="LiveId" clId="{DBF7E791-651D-4F15-8628-A795EB6714FC}"/>
     <pc:docChg chg="custSel modSld">
-      <pc:chgData name="Daniel Ahn" userId="cb1d34211dc1be1a" providerId="LiveId" clId="{DBF7E791-651D-4F15-8628-A795EB6714FC}" dt="2023-09-01T13:31:17.826" v="499" actId="20577"/>
+      <pc:chgData name="Daniel Ahn" userId="cb1d34211dc1be1a" providerId="LiveId" clId="{DBF7E791-651D-4F15-8628-A795EB6714FC}" dt="2023-12-01T03:54:34.271" v="516" actId="20577"/>
       <pc:docMkLst>
         <pc:docMk/>
       </pc:docMkLst>
@@ -219,13 +219,13 @@
         </pc:spChg>
       </pc:sldChg>
       <pc:sldChg chg="modSp mod">
-        <pc:chgData name="Daniel Ahn" userId="cb1d34211dc1be1a" providerId="LiveId" clId="{DBF7E791-651D-4F15-8628-A795EB6714FC}" dt="2023-09-01T13:28:25.007" v="380" actId="20577"/>
+        <pc:chgData name="Daniel Ahn" userId="cb1d34211dc1be1a" providerId="LiveId" clId="{DBF7E791-651D-4F15-8628-A795EB6714FC}" dt="2023-12-01T03:54:34.271" v="516" actId="20577"/>
         <pc:sldMkLst>
           <pc:docMk/>
           <pc:sldMk cId="733213278" sldId="348"/>
         </pc:sldMkLst>
         <pc:spChg chg="mod">
-          <ac:chgData name="Daniel Ahn" userId="cb1d34211dc1be1a" providerId="LiveId" clId="{DBF7E791-651D-4F15-8628-A795EB6714FC}" dt="2023-09-01T13:28:25.007" v="380" actId="20577"/>
+          <ac:chgData name="Daniel Ahn" userId="cb1d34211dc1be1a" providerId="LiveId" clId="{DBF7E791-651D-4F15-8628-A795EB6714FC}" dt="2023-12-01T03:54:34.271" v="516" actId="20577"/>
           <ac:spMkLst>
             <pc:docMk/>
             <pc:sldMk cId="733213278" sldId="348"/>
@@ -381,7 +381,7 @@
             <a:fld id="{8AD1700A-0812-4960-BDAF-BBEBDA6F415D}" type="datetime1">
               <a:rPr lang="en-US" altLang="en-US"/>
               <a:pPr/>
-              <a:t>9/1/2023</a:t>
+              <a:t>11/30/2023</a:t>
             </a:fld>
             <a:endParaRPr lang="en-US" altLang="en-US"/>
           </a:p>
@@ -663,7 +663,7 @@
           </a:ln>
           <a:extLst>
             <a:ext uri="{909E8E84-426E-40dd-AFC4-6F175D3DCCD1}">
-              <a14:hiddenFill xmlns="" xmlns:a14="http://schemas.microsoft.com/office/drawing/2010/main">
+              <a14:hiddenFill xmlns:a14="http://schemas.microsoft.com/office/drawing/2010/main" xmlns="">
                 <a:solidFill>
                   <a:srgbClr val="FFFFFF"/>
                 </a:solidFill>
@@ -1048,14 +1048,14 @@
           <a:ln/>
           <a:extLst>
             <a:ext uri="{909E8E84-426E-40dd-AFC4-6F175D3DCCD1}">
-              <a14:hiddenFill xmlns="" xmlns:a14="http://schemas.microsoft.com/office/drawing/2010/main">
+              <a14:hiddenFill xmlns:a14="http://schemas.microsoft.com/office/drawing/2010/main" xmlns="">
                 <a:solidFill>
                   <a:srgbClr val="FFFFFF"/>
                 </a:solidFill>
               </a14:hiddenFill>
             </a:ext>
             <a:ext uri="{91240B29-F687-4f45-9708-019B960494DF}">
-              <a14:hiddenLine xmlns="" xmlns:a14="http://schemas.microsoft.com/office/drawing/2010/main" w="9525">
+              <a14:hiddenLine xmlns:a14="http://schemas.microsoft.com/office/drawing/2010/main" xmlns="" w="9525">
                 <a:solidFill>
                   <a:srgbClr val="000000"/>
                 </a:solidFill>
@@ -1097,14 +1097,14 @@
           <a:ln/>
           <a:extLst>
             <a:ext uri="{909E8E84-426E-40dd-AFC4-6F175D3DCCD1}">
-              <a14:hiddenFill xmlns="" xmlns:a14="http://schemas.microsoft.com/office/drawing/2010/main">
+              <a14:hiddenFill xmlns:a14="http://schemas.microsoft.com/office/drawing/2010/main" xmlns="">
                 <a:solidFill>
                   <a:srgbClr val="FFFFFF"/>
                 </a:solidFill>
               </a14:hiddenFill>
             </a:ext>
             <a:ext uri="{91240B29-F687-4f45-9708-019B960494DF}">
-              <a14:hiddenLine xmlns="" xmlns:a14="http://schemas.microsoft.com/office/drawing/2010/main" w="9525">
+              <a14:hiddenLine xmlns:a14="http://schemas.microsoft.com/office/drawing/2010/main" xmlns="" w="9525">
                 <a:solidFill>
                   <a:srgbClr val="000000"/>
                 </a:solidFill>
@@ -1305,7 +1305,7 @@
           </a:ln>
           <a:extLst>
             <a:ext uri="{91240B29-F687-4f45-9708-019B960494DF}">
-              <a14:hiddenLine xmlns="" xmlns:a14="http://schemas.microsoft.com/office/drawing/2010/main" w="9525">
+              <a14:hiddenLine xmlns:a14="http://schemas.microsoft.com/office/drawing/2010/main" xmlns="" w="9525">
                 <a:solidFill>
                   <a:srgbClr val="000000"/>
                 </a:solidFill>
@@ -1471,14 +1471,14 @@
           </a:ln>
           <a:extLst>
             <a:ext uri="{909E8E84-426E-40dd-AFC4-6F175D3DCCD1}">
-              <a14:hiddenFill xmlns="" xmlns:a14="http://schemas.microsoft.com/office/drawing/2010/main">
+              <a14:hiddenFill xmlns:a14="http://schemas.microsoft.com/office/drawing/2010/main" xmlns="">
                 <a:solidFill>
                   <a:srgbClr val="FFFFFF"/>
                 </a:solidFill>
               </a14:hiddenFill>
             </a:ext>
             <a:ext uri="{91240B29-F687-4f45-9708-019B960494DF}">
-              <a14:hiddenLine xmlns="" xmlns:a14="http://schemas.microsoft.com/office/drawing/2010/main" w="9525">
+              <a14:hiddenLine xmlns:a14="http://schemas.microsoft.com/office/drawing/2010/main" xmlns="" w="9525">
                 <a:solidFill>
                   <a:srgbClr val="000000"/>
                 </a:solidFill>
@@ -3712,7 +3712,7 @@
             </a:ln>
             <a:extLst>
               <a:ext uri="{91240B29-F687-4f45-9708-019B960494DF}">
-                <a14:hiddenLine xmlns="" xmlns:a14="http://schemas.microsoft.com/office/drawing/2010/main" w="9525">
+                <a14:hiddenLine xmlns:a14="http://schemas.microsoft.com/office/drawing/2010/main" xmlns="" w="9525">
                   <a:solidFill>
                     <a:srgbClr val="000000"/>
                   </a:solidFill>
@@ -3875,7 +3875,7 @@
             </a:ln>
             <a:extLst>
               <a:ext uri="{91240B29-F687-4f45-9708-019B960494DF}">
-                <a14:hiddenLine xmlns="" xmlns:a14="http://schemas.microsoft.com/office/drawing/2010/main" w="9525">
+                <a14:hiddenLine xmlns:a14="http://schemas.microsoft.com/office/drawing/2010/main" xmlns="" w="9525">
                   <a:solidFill>
                     <a:srgbClr val="000000"/>
                   </a:solidFill>
@@ -4031,14 +4031,14 @@
           </a:ln>
           <a:extLst>
             <a:ext uri="{909E8E84-426E-40dd-AFC4-6F175D3DCCD1}">
-              <a14:hiddenFill xmlns="" xmlns:a14="http://schemas.microsoft.com/office/drawing/2010/main">
+              <a14:hiddenFill xmlns:a14="http://schemas.microsoft.com/office/drawing/2010/main" xmlns="">
                 <a:solidFill>
                   <a:srgbClr val="FFFFFF"/>
                 </a:solidFill>
               </a14:hiddenFill>
             </a:ext>
             <a:ext uri="{91240B29-F687-4f45-9708-019B960494DF}">
-              <a14:hiddenLine xmlns="" xmlns:a14="http://schemas.microsoft.com/office/drawing/2010/main" w="9525">
+              <a14:hiddenLine xmlns:a14="http://schemas.microsoft.com/office/drawing/2010/main" xmlns="" w="9525">
                 <a:solidFill>
                   <a:srgbClr val="000000"/>
                 </a:solidFill>
@@ -4095,14 +4095,14 @@
           </a:ln>
           <a:extLst>
             <a:ext uri="{909E8E84-426E-40dd-AFC4-6F175D3DCCD1}">
-              <a14:hiddenFill xmlns="" xmlns:a14="http://schemas.microsoft.com/office/drawing/2010/main">
+              <a14:hiddenFill xmlns:a14="http://schemas.microsoft.com/office/drawing/2010/main" xmlns="">
                 <a:solidFill>
                   <a:srgbClr val="FFFFFF"/>
                 </a:solidFill>
               </a14:hiddenFill>
             </a:ext>
             <a:ext uri="{91240B29-F687-4f45-9708-019B960494DF}">
-              <a14:hiddenLine xmlns="" xmlns:a14="http://schemas.microsoft.com/office/drawing/2010/main" w="9525">
+              <a14:hiddenLine xmlns:a14="http://schemas.microsoft.com/office/drawing/2010/main" xmlns="" w="9525">
                 <a:solidFill>
                   <a:srgbClr val="000000"/>
                 </a:solidFill>
@@ -4198,14 +4198,14 @@
           </a:ln>
           <a:extLst>
             <a:ext uri="{909E8E84-426E-40dd-AFC4-6F175D3DCCD1}">
-              <a14:hiddenFill xmlns="" xmlns:a14="http://schemas.microsoft.com/office/drawing/2010/main">
+              <a14:hiddenFill xmlns:a14="http://schemas.microsoft.com/office/drawing/2010/main" xmlns="">
                 <a:solidFill>
                   <a:srgbClr val="FFFFFF"/>
                 </a:solidFill>
               </a14:hiddenFill>
             </a:ext>
             <a:ext uri="{91240B29-F687-4f45-9708-019B960494DF}">
-              <a14:hiddenLine xmlns="" xmlns:a14="http://schemas.microsoft.com/office/drawing/2010/main" w="9525">
+              <a14:hiddenLine xmlns:a14="http://schemas.microsoft.com/office/drawing/2010/main" xmlns="" w="9525">
                 <a:solidFill>
                   <a:srgbClr val="000000"/>
                 </a:solidFill>
@@ -4777,14 +4777,14 @@
           </a:ln>
           <a:extLst>
             <a:ext uri="{909E8E84-426E-40dd-AFC4-6F175D3DCCD1}">
-              <a14:hiddenFill xmlns="" xmlns:a14="http://schemas.microsoft.com/office/drawing/2010/main">
+              <a14:hiddenFill xmlns:a14="http://schemas.microsoft.com/office/drawing/2010/main" xmlns="">
                 <a:solidFill>
                   <a:srgbClr val="FFFFFF"/>
                 </a:solidFill>
               </a14:hiddenFill>
             </a:ext>
             <a:ext uri="{91240B29-F687-4f45-9708-019B960494DF}">
-              <a14:hiddenLine xmlns="" xmlns:a14="http://schemas.microsoft.com/office/drawing/2010/main" w="9525">
+              <a14:hiddenLine xmlns:a14="http://schemas.microsoft.com/office/drawing/2010/main" xmlns="" w="9525">
                 <a:solidFill>
                   <a:srgbClr val="000000"/>
                 </a:solidFill>
@@ -4907,14 +4907,14 @@
           </a:ln>
           <a:extLst>
             <a:ext uri="{909E8E84-426E-40dd-AFC4-6F175D3DCCD1}">
-              <a14:hiddenFill xmlns="" xmlns:a14="http://schemas.microsoft.com/office/drawing/2010/main">
+              <a14:hiddenFill xmlns:a14="http://schemas.microsoft.com/office/drawing/2010/main" xmlns="">
                 <a:solidFill>
                   <a:srgbClr val="FFFFFF"/>
                 </a:solidFill>
               </a14:hiddenFill>
             </a:ext>
             <a:ext uri="{91240B29-F687-4f45-9708-019B960494DF}">
-              <a14:hiddenLine xmlns="" xmlns:a14="http://schemas.microsoft.com/office/drawing/2010/main" w="9525">
+              <a14:hiddenLine xmlns:a14="http://schemas.microsoft.com/office/drawing/2010/main" xmlns="" w="9525">
                 <a:solidFill>
                   <a:srgbClr val="000000"/>
                 </a:solidFill>
@@ -5233,8 +5233,21 @@
                   <a:srgbClr val="FF0000"/>
                 </a:solidFill>
               </a:rPr>
-              <a:t>following Friday before class</a:t>
-            </a:r>
+              <a:t>following Friday </a:t>
+            </a:r>
+            <a:r>
+              <a:rPr lang="en-US" altLang="en-US">
+                <a:solidFill>
+                  <a:srgbClr val="FF0000"/>
+                </a:solidFill>
+              </a:rPr>
+              <a:t>by midnight</a:t>
+            </a:r>
+            <a:endParaRPr lang="en-US" altLang="en-US" dirty="0">
+              <a:solidFill>
+                <a:srgbClr val="FF0000"/>
+              </a:solidFill>
+            </a:endParaRPr>
           </a:p>
           <a:p>
             <a:pPr lvl="1"/>

</xml_diff>